<commit_message>
moved practice exercises from day3 to day2
</commit_message>
<xml_diff>
--- a/files/slides/slides_day2.pptx
+++ b/files/slides/slides_day2.pptx
@@ -5,7 +5,7 @@
     <p:sldMasterId id="2147483660" r:id="rId1"/>
   </p:sldMasterIdLst>
   <p:notesMasterIdLst>
-    <p:notesMasterId r:id="rId31"/>
+    <p:notesMasterId r:id="rId32"/>
   </p:notesMasterIdLst>
   <p:sldIdLst>
     <p:sldId id="256" r:id="rId2"/>
@@ -36,7 +36,8 @@
     <p:sldId id="388" r:id="rId27"/>
     <p:sldId id="381" r:id="rId28"/>
     <p:sldId id="472" r:id="rId29"/>
-    <p:sldId id="470" r:id="rId30"/>
+    <p:sldId id="473" r:id="rId30"/>
+    <p:sldId id="470" r:id="rId31"/>
   </p:sldIdLst>
   <p:sldSz cx="9144000" cy="6858000" type="screen4x3"/>
   <p:notesSz cx="6858000" cy="9144000"/>
@@ -236,7 +237,7 @@
           <a:p>
             <a:fld id="{F833E4A7-8C8F-0444-B05A-6DE0ED7B35B0}" type="datetimeFigureOut">
               <a:rPr lang="en-US" smtClean="0"/>
-              <a:t>5/19/18</a:t>
+              <a:t>5/21/18</a:t>
             </a:fld>
             <a:endParaRPr lang="en-US"/>
           </a:p>
@@ -697,7 +698,7 @@
           <a:p>
             <a:fld id="{CAF647BD-C221-1844-9ED2-A7F7759EF665}" type="datetimeFigureOut">
               <a:rPr lang="en-US" smtClean="0"/>
-              <a:t>5/19/18</a:t>
+              <a:t>5/21/18</a:t>
             </a:fld>
             <a:endParaRPr lang="en-US"/>
           </a:p>
@@ -962,7 +963,7 @@
           <a:p>
             <a:fld id="{CAF647BD-C221-1844-9ED2-A7F7759EF665}" type="datetimeFigureOut">
               <a:rPr lang="en-US" smtClean="0"/>
-              <a:t>5/19/18</a:t>
+              <a:t>5/21/18</a:t>
             </a:fld>
             <a:endParaRPr lang="en-US"/>
           </a:p>
@@ -1137,7 +1138,7 @@
           <a:p>
             <a:fld id="{CAF647BD-C221-1844-9ED2-A7F7759EF665}" type="datetimeFigureOut">
               <a:rPr lang="en-US" smtClean="0"/>
-              <a:t>5/19/18</a:t>
+              <a:t>5/21/18</a:t>
             </a:fld>
             <a:endParaRPr lang="en-US"/>
           </a:p>
@@ -1302,7 +1303,7 @@
           <a:p>
             <a:fld id="{CAF647BD-C221-1844-9ED2-A7F7759EF665}" type="datetimeFigureOut">
               <a:rPr lang="en-US" smtClean="0"/>
-              <a:t>5/19/18</a:t>
+              <a:t>5/21/18</a:t>
             </a:fld>
             <a:endParaRPr lang="en-US"/>
           </a:p>
@@ -1551,7 +1552,7 @@
           <a:p>
             <a:fld id="{CAF647BD-C221-1844-9ED2-A7F7759EF665}" type="datetimeFigureOut">
               <a:rPr lang="en-US" smtClean="0"/>
-              <a:t>5/19/18</a:t>
+              <a:t>5/21/18</a:t>
             </a:fld>
             <a:endParaRPr lang="en-US"/>
           </a:p>
@@ -1834,7 +1835,7 @@
           <a:p>
             <a:fld id="{CAF647BD-C221-1844-9ED2-A7F7759EF665}" type="datetimeFigureOut">
               <a:rPr lang="en-US" smtClean="0"/>
-              <a:t>5/19/18</a:t>
+              <a:t>5/21/18</a:t>
             </a:fld>
             <a:endParaRPr lang="en-US"/>
           </a:p>
@@ -2273,7 +2274,7 @@
           <a:p>
             <a:fld id="{CAF647BD-C221-1844-9ED2-A7F7759EF665}" type="datetimeFigureOut">
               <a:rPr lang="en-US" smtClean="0"/>
-              <a:t>5/19/18</a:t>
+              <a:t>5/21/18</a:t>
             </a:fld>
             <a:endParaRPr lang="en-US"/>
           </a:p>
@@ -2386,7 +2387,7 @@
           <a:p>
             <a:fld id="{CAF647BD-C221-1844-9ED2-A7F7759EF665}" type="datetimeFigureOut">
               <a:rPr lang="en-US" smtClean="0"/>
-              <a:t>5/19/18</a:t>
+              <a:t>5/21/18</a:t>
             </a:fld>
             <a:endParaRPr lang="en-US"/>
           </a:p>
@@ -2476,7 +2477,7 @@
           <a:p>
             <a:fld id="{CAF647BD-C221-1844-9ED2-A7F7759EF665}" type="datetimeFigureOut">
               <a:rPr lang="en-US" smtClean="0"/>
-              <a:t>5/19/18</a:t>
+              <a:t>5/21/18</a:t>
             </a:fld>
             <a:endParaRPr lang="en-US"/>
           </a:p>
@@ -2718,7 +2719,7 @@
           <a:p>
             <a:fld id="{CAF647BD-C221-1844-9ED2-A7F7759EF665}" type="datetimeFigureOut">
               <a:rPr lang="en-US" smtClean="0"/>
-              <a:t>5/19/18</a:t>
+              <a:t>5/21/18</a:t>
             </a:fld>
             <a:endParaRPr lang="en-US"/>
           </a:p>
@@ -3012,7 +3013,7 @@
           <a:p>
             <a:fld id="{CAF647BD-C221-1844-9ED2-A7F7759EF665}" type="datetimeFigureOut">
               <a:rPr lang="en-US" smtClean="0"/>
-              <a:t>5/19/18</a:t>
+              <a:t>5/21/18</a:t>
             </a:fld>
             <a:endParaRPr lang="en-US"/>
           </a:p>
@@ -3306,7 +3307,7 @@
           <a:p>
             <a:fld id="{CAF647BD-C221-1844-9ED2-A7F7759EF665}" type="datetimeFigureOut">
               <a:rPr lang="en-US" smtClean="0"/>
-              <a:t>5/19/18</a:t>
+              <a:t>5/21/18</a:t>
             </a:fld>
             <a:endParaRPr lang="en-US"/>
           </a:p>
@@ -13085,28 +13086,750 @@
             <p:ph type="title"/>
           </p:nvPr>
         </p:nvSpPr>
+        <p:spPr/>
+        <p:txBody>
+          <a:bodyPr>
+            <a:normAutofit/>
+          </a:bodyPr>
+          <a:lstStyle/>
+          <a:p>
+            <a:r>
+              <a:rPr lang="en-US" dirty="0" smtClean="0"/>
+              <a:t>A handy dictionary technique</a:t>
+            </a:r>
+            <a:endParaRPr lang="en-US" dirty="0"/>
+          </a:p>
+        </p:txBody>
+      </p:sp>
+      <p:sp>
+        <p:nvSpPr>
+          <p:cNvPr id="3" name="Content Placeholder 2"/>
+          <p:cNvSpPr>
+            <a:spLocks noGrp="1"/>
+          </p:cNvSpPr>
+          <p:nvPr>
+            <p:ph idx="1"/>
+          </p:nvPr>
+        </p:nvSpPr>
+        <p:spPr/>
+        <p:txBody>
+          <a:bodyPr>
+            <a:normAutofit/>
+          </a:bodyPr>
+          <a:lstStyle/>
+          <a:p>
+            <a:r>
+              <a:rPr lang="en-US" sz="2000" dirty="0" smtClean="0"/>
+              <a:t>The task: </a:t>
+            </a:r>
+            <a:r>
+              <a:rPr lang="en-US" sz="2000" b="0" dirty="0" smtClean="0"/>
+              <a:t>Count the number of each character in a string, by creating a dictionary, </a:t>
+            </a:r>
+            <a:r>
+              <a:rPr lang="en-US" sz="2000" b="0" dirty="0" err="1" smtClean="0">
+                <a:latin typeface="Monaco" charset="0"/>
+                <a:ea typeface="Monaco" charset="0"/>
+                <a:cs typeface="Monaco" charset="0"/>
+              </a:rPr>
+              <a:t>key:value</a:t>
+            </a:r>
+            <a:r>
+              <a:rPr lang="en-US" sz="2000" b="0" dirty="0" smtClean="0">
+                <a:latin typeface="Monaco" charset="0"/>
+                <a:ea typeface="Monaco" charset="0"/>
+                <a:cs typeface="Monaco" charset="0"/>
+              </a:rPr>
+              <a:t>::</a:t>
+            </a:r>
+            <a:r>
+              <a:rPr lang="en-US" sz="2000" b="0" dirty="0" err="1" smtClean="0">
+                <a:latin typeface="Monaco" charset="0"/>
+                <a:ea typeface="Monaco" charset="0"/>
+                <a:cs typeface="Monaco" charset="0"/>
+              </a:rPr>
+              <a:t>character:count</a:t>
+            </a:r>
+            <a:r>
+              <a:rPr lang="en-US" sz="2000" b="0" dirty="0" smtClean="0"/>
+              <a:t>. </a:t>
+            </a:r>
+          </a:p>
+          <a:p>
+            <a:r>
+              <a:rPr lang="en-US" sz="2000" dirty="0" smtClean="0"/>
+              <a:t>The catch: </a:t>
+            </a:r>
+            <a:r>
+              <a:rPr lang="en-US" sz="2000" b="0" dirty="0" smtClean="0"/>
+              <a:t>You don't know beforehand what characters are there!</a:t>
+            </a:r>
+            <a:endParaRPr lang="en-US" sz="2000" b="0" dirty="0"/>
+          </a:p>
+        </p:txBody>
+      </p:sp>
+      <p:sp>
+        <p:nvSpPr>
+          <p:cNvPr id="4" name="TextBox 3"/>
+          <p:cNvSpPr txBox="1"/>
+          <p:nvPr/>
+        </p:nvSpPr>
         <p:spPr>
           <a:xfrm>
-            <a:off x="2230714" y="3087537"/>
-            <a:ext cx="4688183" cy="692215"/>
+            <a:off x="457199" y="3170764"/>
+            <a:ext cx="8338444" cy="4124206"/>
           </a:xfrm>
+          <a:prstGeom prst="rect">
+            <a:avLst/>
+          </a:prstGeom>
+          <a:noFill/>
         </p:spPr>
         <p:txBody>
-          <a:bodyPr/>
+          <a:bodyPr wrap="square" rtlCol="0">
+            <a:spAutoFit/>
+          </a:bodyPr>
           <a:lstStyle/>
           <a:p>
             <a:r>
-              <a:rPr lang="en-US" dirty="0" smtClean="0"/>
-              <a:t>exercise break</a:t>
-            </a:r>
-            <a:endParaRPr lang="en-US" dirty="0"/>
+              <a:rPr lang="en-US" dirty="0" smtClean="0">
+                <a:latin typeface="Monaco" charset="0"/>
+                <a:ea typeface="Monaco" charset="0"/>
+                <a:cs typeface="Monaco" charset="0"/>
+              </a:rPr>
+              <a:t>string = "supercalifragilisticexpialidocious"</a:t>
+            </a:r>
+          </a:p>
+          <a:p>
+            <a:endParaRPr lang="en-US" dirty="0" smtClean="0">
+              <a:latin typeface="Monaco" charset="0"/>
+              <a:ea typeface="Monaco" charset="0"/>
+              <a:cs typeface="Monaco" charset="0"/>
+            </a:endParaRPr>
+          </a:p>
+          <a:p>
+            <a:r>
+              <a:rPr lang="en-US" dirty="0" err="1" smtClean="0">
+                <a:latin typeface="Monaco" charset="0"/>
+                <a:ea typeface="Monaco" charset="0"/>
+                <a:cs typeface="Monaco" charset="0"/>
+              </a:rPr>
+              <a:t>string_counts</a:t>
+            </a:r>
+            <a:r>
+              <a:rPr lang="en-US" dirty="0" smtClean="0">
+                <a:latin typeface="Monaco" charset="0"/>
+                <a:ea typeface="Monaco" charset="0"/>
+                <a:cs typeface="Monaco" charset="0"/>
+              </a:rPr>
+              <a:t> = {}</a:t>
+            </a:r>
+            <a:endParaRPr lang="en-US" dirty="0">
+              <a:latin typeface="Monaco" charset="0"/>
+              <a:ea typeface="Monaco" charset="0"/>
+              <a:cs typeface="Monaco" charset="0"/>
+            </a:endParaRPr>
+          </a:p>
+          <a:p>
+            <a:r>
+              <a:rPr lang="en-US" dirty="0" smtClean="0">
+                <a:latin typeface="Monaco" charset="0"/>
+                <a:ea typeface="Monaco" charset="0"/>
+                <a:cs typeface="Monaco" charset="0"/>
+              </a:rPr>
+              <a:t>for item in string:</a:t>
+            </a:r>
+          </a:p>
+          <a:p>
+            <a:r>
+              <a:rPr lang="en-US" dirty="0">
+                <a:latin typeface="Monaco" charset="0"/>
+                <a:ea typeface="Monaco" charset="0"/>
+                <a:cs typeface="Monaco" charset="0"/>
+              </a:rPr>
+              <a:t>	</a:t>
+            </a:r>
+            <a:r>
+              <a:rPr lang="en-US" dirty="0" smtClean="0">
+                <a:latin typeface="Monaco" charset="0"/>
+                <a:ea typeface="Monaco" charset="0"/>
+                <a:cs typeface="Monaco" charset="0"/>
+              </a:rPr>
+              <a:t>if item in </a:t>
+            </a:r>
+            <a:r>
+              <a:rPr lang="en-US" dirty="0" err="1" smtClean="0">
+                <a:latin typeface="Monaco" charset="0"/>
+                <a:ea typeface="Monaco" charset="0"/>
+                <a:cs typeface="Monaco" charset="0"/>
+              </a:rPr>
+              <a:t>string_counts</a:t>
+            </a:r>
+            <a:r>
+              <a:rPr lang="en-US" dirty="0" smtClean="0">
+                <a:latin typeface="Monaco" charset="0"/>
+                <a:ea typeface="Monaco" charset="0"/>
+                <a:cs typeface="Monaco" charset="0"/>
+              </a:rPr>
+              <a:t>:</a:t>
+            </a:r>
+          </a:p>
+          <a:p>
+            <a:r>
+              <a:rPr lang="en-US" dirty="0">
+                <a:latin typeface="Monaco" charset="0"/>
+                <a:ea typeface="Monaco" charset="0"/>
+                <a:cs typeface="Monaco" charset="0"/>
+              </a:rPr>
+              <a:t>	</a:t>
+            </a:r>
+            <a:r>
+              <a:rPr lang="en-US" dirty="0" smtClean="0">
+                <a:latin typeface="Monaco" charset="0"/>
+                <a:ea typeface="Monaco" charset="0"/>
+                <a:cs typeface="Monaco" charset="0"/>
+              </a:rPr>
+              <a:t>	</a:t>
+            </a:r>
+            <a:r>
+              <a:rPr lang="en-US" dirty="0" err="1" smtClean="0">
+                <a:latin typeface="Monaco" charset="0"/>
+                <a:ea typeface="Monaco" charset="0"/>
+                <a:cs typeface="Monaco" charset="0"/>
+              </a:rPr>
+              <a:t>string_counts</a:t>
+            </a:r>
+            <a:r>
+              <a:rPr lang="en-US" dirty="0" smtClean="0">
+                <a:latin typeface="Monaco" charset="0"/>
+                <a:ea typeface="Monaco" charset="0"/>
+                <a:cs typeface="Monaco" charset="0"/>
+              </a:rPr>
+              <a:t>[item] += 1</a:t>
+            </a:r>
+          </a:p>
+          <a:p>
+            <a:r>
+              <a:rPr lang="en-US" dirty="0">
+                <a:latin typeface="Monaco" charset="0"/>
+                <a:ea typeface="Monaco" charset="0"/>
+                <a:cs typeface="Monaco" charset="0"/>
+              </a:rPr>
+              <a:t>	</a:t>
+            </a:r>
+            <a:r>
+              <a:rPr lang="en-US" dirty="0" smtClean="0">
+                <a:latin typeface="Monaco" charset="0"/>
+                <a:ea typeface="Monaco" charset="0"/>
+                <a:cs typeface="Monaco" charset="0"/>
+              </a:rPr>
+              <a:t>else:</a:t>
+            </a:r>
+          </a:p>
+          <a:p>
+            <a:r>
+              <a:rPr lang="en-US" dirty="0">
+                <a:latin typeface="Monaco" charset="0"/>
+                <a:ea typeface="Monaco" charset="0"/>
+                <a:cs typeface="Monaco" charset="0"/>
+              </a:rPr>
+              <a:t>		</a:t>
+            </a:r>
+            <a:r>
+              <a:rPr lang="en-US" dirty="0" err="1" smtClean="0">
+                <a:latin typeface="Monaco" charset="0"/>
+                <a:ea typeface="Monaco" charset="0"/>
+                <a:cs typeface="Monaco" charset="0"/>
+              </a:rPr>
+              <a:t>string_counts</a:t>
+            </a:r>
+            <a:r>
+              <a:rPr lang="en-US" dirty="0" smtClean="0">
+                <a:latin typeface="Monaco" charset="0"/>
+                <a:ea typeface="Monaco" charset="0"/>
+                <a:cs typeface="Monaco" charset="0"/>
+              </a:rPr>
+              <a:t>[item] = 1</a:t>
+            </a:r>
+          </a:p>
+          <a:p>
+            <a:endParaRPr lang="en-US" dirty="0">
+              <a:latin typeface="Monaco" charset="0"/>
+              <a:ea typeface="Monaco" charset="0"/>
+              <a:cs typeface="Monaco" charset="0"/>
+            </a:endParaRPr>
+          </a:p>
+          <a:p>
+            <a:r>
+              <a:rPr lang="en-US" dirty="0" smtClean="0">
+                <a:latin typeface="Monaco" charset="0"/>
+                <a:ea typeface="Monaco" charset="0"/>
+                <a:cs typeface="Monaco" charset="0"/>
+              </a:rPr>
+              <a:t>print(</a:t>
+            </a:r>
+            <a:r>
+              <a:rPr lang="en-US" dirty="0" err="1" smtClean="0">
+                <a:latin typeface="Monaco" charset="0"/>
+                <a:ea typeface="Monaco" charset="0"/>
+                <a:cs typeface="Monaco" charset="0"/>
+              </a:rPr>
+              <a:t>string_counts</a:t>
+            </a:r>
+            <a:r>
+              <a:rPr lang="en-US" dirty="0" smtClean="0">
+                <a:latin typeface="Monaco" charset="0"/>
+                <a:ea typeface="Monaco" charset="0"/>
+                <a:cs typeface="Monaco" charset="0"/>
+              </a:rPr>
+              <a:t>)</a:t>
+            </a:r>
+          </a:p>
+          <a:p>
+            <a:r>
+              <a:rPr lang="en-US" sz="1400" dirty="0" smtClean="0">
+                <a:solidFill>
+                  <a:schemeClr val="bg1">
+                    <a:lumMod val="65000"/>
+                  </a:schemeClr>
+                </a:solidFill>
+                <a:latin typeface="Monaco" charset="0"/>
+                <a:ea typeface="Monaco" charset="0"/>
+                <a:cs typeface="Monaco" charset="0"/>
+              </a:rPr>
+              <a:t>	</a:t>
+            </a:r>
+            <a:r>
+              <a:rPr lang="mr-IN" sz="1400" dirty="0">
+                <a:solidFill>
+                  <a:schemeClr val="bg1">
+                    <a:lumMod val="65000"/>
+                  </a:schemeClr>
+                </a:solidFill>
+                <a:latin typeface="Monaco" charset="0"/>
+                <a:ea typeface="Monaco" charset="0"/>
+                <a:cs typeface="Monaco" charset="0"/>
+              </a:rPr>
+              <a:t>{'</a:t>
+            </a:r>
+            <a:r>
+              <a:rPr lang="mr-IN" sz="1400" dirty="0" err="1">
+                <a:solidFill>
+                  <a:schemeClr val="bg1">
+                    <a:lumMod val="65000"/>
+                  </a:schemeClr>
+                </a:solidFill>
+                <a:latin typeface="Monaco" charset="0"/>
+                <a:ea typeface="Monaco" charset="0"/>
+                <a:cs typeface="Monaco" charset="0"/>
+              </a:rPr>
+              <a:t>s</a:t>
+            </a:r>
+            <a:r>
+              <a:rPr lang="mr-IN" sz="1400" dirty="0">
+                <a:solidFill>
+                  <a:schemeClr val="bg1">
+                    <a:lumMod val="65000"/>
+                  </a:schemeClr>
+                </a:solidFill>
+                <a:latin typeface="Monaco" charset="0"/>
+                <a:ea typeface="Monaco" charset="0"/>
+                <a:cs typeface="Monaco" charset="0"/>
+              </a:rPr>
+              <a:t>': 3, '</a:t>
+            </a:r>
+            <a:r>
+              <a:rPr lang="mr-IN" sz="1400" dirty="0" err="1">
+                <a:solidFill>
+                  <a:schemeClr val="bg1">
+                    <a:lumMod val="65000"/>
+                  </a:schemeClr>
+                </a:solidFill>
+                <a:latin typeface="Monaco" charset="0"/>
+                <a:ea typeface="Monaco" charset="0"/>
+                <a:cs typeface="Monaco" charset="0"/>
+              </a:rPr>
+              <a:t>u</a:t>
+            </a:r>
+            <a:r>
+              <a:rPr lang="mr-IN" sz="1400" dirty="0">
+                <a:solidFill>
+                  <a:schemeClr val="bg1">
+                    <a:lumMod val="65000"/>
+                  </a:schemeClr>
+                </a:solidFill>
+                <a:latin typeface="Monaco" charset="0"/>
+                <a:ea typeface="Monaco" charset="0"/>
+                <a:cs typeface="Monaco" charset="0"/>
+              </a:rPr>
+              <a:t>': 2, '</a:t>
+            </a:r>
+            <a:r>
+              <a:rPr lang="mr-IN" sz="1400" dirty="0" err="1">
+                <a:solidFill>
+                  <a:schemeClr val="bg1">
+                    <a:lumMod val="65000"/>
+                  </a:schemeClr>
+                </a:solidFill>
+                <a:latin typeface="Monaco" charset="0"/>
+                <a:ea typeface="Monaco" charset="0"/>
+                <a:cs typeface="Monaco" charset="0"/>
+              </a:rPr>
+              <a:t>p</a:t>
+            </a:r>
+            <a:r>
+              <a:rPr lang="mr-IN" sz="1400" dirty="0">
+                <a:solidFill>
+                  <a:schemeClr val="bg1">
+                    <a:lumMod val="65000"/>
+                  </a:schemeClr>
+                </a:solidFill>
+                <a:latin typeface="Monaco" charset="0"/>
+                <a:ea typeface="Monaco" charset="0"/>
+                <a:cs typeface="Monaco" charset="0"/>
+              </a:rPr>
+              <a:t>': 2, '</a:t>
+            </a:r>
+            <a:r>
+              <a:rPr lang="mr-IN" sz="1400" dirty="0" err="1">
+                <a:solidFill>
+                  <a:schemeClr val="bg1">
+                    <a:lumMod val="65000"/>
+                  </a:schemeClr>
+                </a:solidFill>
+                <a:latin typeface="Monaco" charset="0"/>
+                <a:ea typeface="Monaco" charset="0"/>
+                <a:cs typeface="Monaco" charset="0"/>
+              </a:rPr>
+              <a:t>e</a:t>
+            </a:r>
+            <a:r>
+              <a:rPr lang="mr-IN" sz="1400" dirty="0">
+                <a:solidFill>
+                  <a:schemeClr val="bg1">
+                    <a:lumMod val="65000"/>
+                  </a:schemeClr>
+                </a:solidFill>
+                <a:latin typeface="Monaco" charset="0"/>
+                <a:ea typeface="Monaco" charset="0"/>
+                <a:cs typeface="Monaco" charset="0"/>
+              </a:rPr>
+              <a:t>': 2, '</a:t>
+            </a:r>
+            <a:r>
+              <a:rPr lang="mr-IN" sz="1400" dirty="0" err="1">
+                <a:solidFill>
+                  <a:schemeClr val="bg1">
+                    <a:lumMod val="65000"/>
+                  </a:schemeClr>
+                </a:solidFill>
+                <a:latin typeface="Monaco" charset="0"/>
+                <a:ea typeface="Monaco" charset="0"/>
+                <a:cs typeface="Monaco" charset="0"/>
+              </a:rPr>
+              <a:t>r</a:t>
+            </a:r>
+            <a:r>
+              <a:rPr lang="mr-IN" sz="1400" dirty="0">
+                <a:solidFill>
+                  <a:schemeClr val="bg1">
+                    <a:lumMod val="65000"/>
+                  </a:schemeClr>
+                </a:solidFill>
+                <a:latin typeface="Monaco" charset="0"/>
+                <a:ea typeface="Monaco" charset="0"/>
+                <a:cs typeface="Monaco" charset="0"/>
+              </a:rPr>
+              <a:t>': 2, '</a:t>
+            </a:r>
+            <a:r>
+              <a:rPr lang="mr-IN" sz="1400" dirty="0" err="1">
+                <a:solidFill>
+                  <a:schemeClr val="bg1">
+                    <a:lumMod val="65000"/>
+                  </a:schemeClr>
+                </a:solidFill>
+                <a:latin typeface="Monaco" charset="0"/>
+                <a:ea typeface="Monaco" charset="0"/>
+                <a:cs typeface="Monaco" charset="0"/>
+              </a:rPr>
+              <a:t>c</a:t>
+            </a:r>
+            <a:r>
+              <a:rPr lang="mr-IN" sz="1400" dirty="0">
+                <a:solidFill>
+                  <a:schemeClr val="bg1">
+                    <a:lumMod val="65000"/>
+                  </a:schemeClr>
+                </a:solidFill>
+                <a:latin typeface="Monaco" charset="0"/>
+                <a:ea typeface="Monaco" charset="0"/>
+                <a:cs typeface="Monaco" charset="0"/>
+              </a:rPr>
+              <a:t>': 3, '</a:t>
+            </a:r>
+            <a:r>
+              <a:rPr lang="mr-IN" sz="1400" dirty="0" err="1">
+                <a:solidFill>
+                  <a:schemeClr val="bg1">
+                    <a:lumMod val="65000"/>
+                  </a:schemeClr>
+                </a:solidFill>
+                <a:latin typeface="Monaco" charset="0"/>
+                <a:ea typeface="Monaco" charset="0"/>
+                <a:cs typeface="Monaco" charset="0"/>
+              </a:rPr>
+              <a:t>a</a:t>
+            </a:r>
+            <a:r>
+              <a:rPr lang="mr-IN" sz="1400" dirty="0">
+                <a:solidFill>
+                  <a:schemeClr val="bg1">
+                    <a:lumMod val="65000"/>
+                  </a:schemeClr>
+                </a:solidFill>
+                <a:latin typeface="Monaco" charset="0"/>
+                <a:ea typeface="Monaco" charset="0"/>
+                <a:cs typeface="Monaco" charset="0"/>
+              </a:rPr>
+              <a:t>': 3, '</a:t>
+            </a:r>
+            <a:r>
+              <a:rPr lang="mr-IN" sz="1400" dirty="0" err="1">
+                <a:solidFill>
+                  <a:schemeClr val="bg1">
+                    <a:lumMod val="65000"/>
+                  </a:schemeClr>
+                </a:solidFill>
+                <a:latin typeface="Monaco" charset="0"/>
+                <a:ea typeface="Monaco" charset="0"/>
+                <a:cs typeface="Monaco" charset="0"/>
+              </a:rPr>
+              <a:t>l</a:t>
+            </a:r>
+            <a:r>
+              <a:rPr lang="mr-IN" sz="1400" dirty="0">
+                <a:solidFill>
+                  <a:schemeClr val="bg1">
+                    <a:lumMod val="65000"/>
+                  </a:schemeClr>
+                </a:solidFill>
+                <a:latin typeface="Monaco" charset="0"/>
+                <a:ea typeface="Monaco" charset="0"/>
+                <a:cs typeface="Monaco" charset="0"/>
+              </a:rPr>
+              <a:t>': 3, '</a:t>
+            </a:r>
+            <a:r>
+              <a:rPr lang="mr-IN" sz="1400" dirty="0" err="1">
+                <a:solidFill>
+                  <a:schemeClr val="bg1">
+                    <a:lumMod val="65000"/>
+                  </a:schemeClr>
+                </a:solidFill>
+                <a:latin typeface="Monaco" charset="0"/>
+                <a:ea typeface="Monaco" charset="0"/>
+                <a:cs typeface="Monaco" charset="0"/>
+              </a:rPr>
+              <a:t>i</a:t>
+            </a:r>
+            <a:r>
+              <a:rPr lang="mr-IN" sz="1400" dirty="0">
+                <a:solidFill>
+                  <a:schemeClr val="bg1">
+                    <a:lumMod val="65000"/>
+                  </a:schemeClr>
+                </a:solidFill>
+                <a:latin typeface="Monaco" charset="0"/>
+                <a:ea typeface="Monaco" charset="0"/>
+                <a:cs typeface="Monaco" charset="0"/>
+              </a:rPr>
+              <a:t>': 7, '</a:t>
+            </a:r>
+            <a:r>
+              <a:rPr lang="mr-IN" sz="1400" dirty="0" err="1">
+                <a:solidFill>
+                  <a:schemeClr val="bg1">
+                    <a:lumMod val="65000"/>
+                  </a:schemeClr>
+                </a:solidFill>
+                <a:latin typeface="Monaco" charset="0"/>
+                <a:ea typeface="Monaco" charset="0"/>
+                <a:cs typeface="Monaco" charset="0"/>
+              </a:rPr>
+              <a:t>f</a:t>
+            </a:r>
+            <a:r>
+              <a:rPr lang="mr-IN" sz="1400" dirty="0">
+                <a:solidFill>
+                  <a:schemeClr val="bg1">
+                    <a:lumMod val="65000"/>
+                  </a:schemeClr>
+                </a:solidFill>
+                <a:latin typeface="Monaco" charset="0"/>
+                <a:ea typeface="Monaco" charset="0"/>
+                <a:cs typeface="Monaco" charset="0"/>
+              </a:rPr>
+              <a:t>': 1, '</a:t>
+            </a:r>
+            <a:r>
+              <a:rPr lang="mr-IN" sz="1400" dirty="0" err="1">
+                <a:solidFill>
+                  <a:schemeClr val="bg1">
+                    <a:lumMod val="65000"/>
+                  </a:schemeClr>
+                </a:solidFill>
+                <a:latin typeface="Monaco" charset="0"/>
+                <a:ea typeface="Monaco" charset="0"/>
+                <a:cs typeface="Monaco" charset="0"/>
+              </a:rPr>
+              <a:t>g</a:t>
+            </a:r>
+            <a:r>
+              <a:rPr lang="mr-IN" sz="1400" dirty="0">
+                <a:solidFill>
+                  <a:schemeClr val="bg1">
+                    <a:lumMod val="65000"/>
+                  </a:schemeClr>
+                </a:solidFill>
+                <a:latin typeface="Monaco" charset="0"/>
+                <a:ea typeface="Monaco" charset="0"/>
+                <a:cs typeface="Monaco" charset="0"/>
+              </a:rPr>
+              <a:t>': 1, '</a:t>
+            </a:r>
+            <a:r>
+              <a:rPr lang="mr-IN" sz="1400" dirty="0" err="1">
+                <a:solidFill>
+                  <a:schemeClr val="bg1">
+                    <a:lumMod val="65000"/>
+                  </a:schemeClr>
+                </a:solidFill>
+                <a:latin typeface="Monaco" charset="0"/>
+                <a:ea typeface="Monaco" charset="0"/>
+                <a:cs typeface="Monaco" charset="0"/>
+              </a:rPr>
+              <a:t>t</a:t>
+            </a:r>
+            <a:r>
+              <a:rPr lang="mr-IN" sz="1400" dirty="0">
+                <a:solidFill>
+                  <a:schemeClr val="bg1">
+                    <a:lumMod val="65000"/>
+                  </a:schemeClr>
+                </a:solidFill>
+                <a:latin typeface="Monaco" charset="0"/>
+                <a:ea typeface="Monaco" charset="0"/>
+                <a:cs typeface="Monaco" charset="0"/>
+              </a:rPr>
+              <a:t>': 1, '</a:t>
+            </a:r>
+            <a:r>
+              <a:rPr lang="mr-IN" sz="1400" dirty="0" err="1">
+                <a:solidFill>
+                  <a:schemeClr val="bg1">
+                    <a:lumMod val="65000"/>
+                  </a:schemeClr>
+                </a:solidFill>
+                <a:latin typeface="Monaco" charset="0"/>
+                <a:ea typeface="Monaco" charset="0"/>
+                <a:cs typeface="Monaco" charset="0"/>
+              </a:rPr>
+              <a:t>x</a:t>
+            </a:r>
+            <a:r>
+              <a:rPr lang="mr-IN" sz="1400" dirty="0">
+                <a:solidFill>
+                  <a:schemeClr val="bg1">
+                    <a:lumMod val="65000"/>
+                  </a:schemeClr>
+                </a:solidFill>
+                <a:latin typeface="Monaco" charset="0"/>
+                <a:ea typeface="Monaco" charset="0"/>
+                <a:cs typeface="Monaco" charset="0"/>
+              </a:rPr>
+              <a:t>': 1, '</a:t>
+            </a:r>
+            <a:r>
+              <a:rPr lang="mr-IN" sz="1400" dirty="0" err="1">
+                <a:solidFill>
+                  <a:schemeClr val="bg1">
+                    <a:lumMod val="65000"/>
+                  </a:schemeClr>
+                </a:solidFill>
+                <a:latin typeface="Monaco" charset="0"/>
+                <a:ea typeface="Monaco" charset="0"/>
+                <a:cs typeface="Monaco" charset="0"/>
+              </a:rPr>
+              <a:t>d</a:t>
+            </a:r>
+            <a:r>
+              <a:rPr lang="mr-IN" sz="1400" dirty="0">
+                <a:solidFill>
+                  <a:schemeClr val="bg1">
+                    <a:lumMod val="65000"/>
+                  </a:schemeClr>
+                </a:solidFill>
+                <a:latin typeface="Monaco" charset="0"/>
+                <a:ea typeface="Monaco" charset="0"/>
+                <a:cs typeface="Monaco" charset="0"/>
+              </a:rPr>
+              <a:t>': 1, '</a:t>
+            </a:r>
+            <a:r>
+              <a:rPr lang="mr-IN" sz="1400" dirty="0" err="1">
+                <a:solidFill>
+                  <a:schemeClr val="bg1">
+                    <a:lumMod val="65000"/>
+                  </a:schemeClr>
+                </a:solidFill>
+                <a:latin typeface="Monaco" charset="0"/>
+                <a:ea typeface="Monaco" charset="0"/>
+                <a:cs typeface="Monaco" charset="0"/>
+              </a:rPr>
+              <a:t>o</a:t>
+            </a:r>
+            <a:r>
+              <a:rPr lang="mr-IN" sz="1400" dirty="0">
+                <a:solidFill>
+                  <a:schemeClr val="bg1">
+                    <a:lumMod val="65000"/>
+                  </a:schemeClr>
+                </a:solidFill>
+                <a:latin typeface="Monaco" charset="0"/>
+                <a:ea typeface="Monaco" charset="0"/>
+                <a:cs typeface="Monaco" charset="0"/>
+              </a:rPr>
+              <a:t>': 2}</a:t>
+            </a:r>
+          </a:p>
+          <a:p>
+            <a:endParaRPr lang="en-US" dirty="0" smtClean="0">
+              <a:latin typeface="Monaco" charset="0"/>
+              <a:ea typeface="Monaco" charset="0"/>
+              <a:cs typeface="Monaco" charset="0"/>
+            </a:endParaRPr>
+          </a:p>
+          <a:p>
+            <a:endParaRPr lang="en-US" dirty="0" smtClean="0">
+              <a:solidFill>
+                <a:srgbClr val="DC5924"/>
+              </a:solidFill>
+              <a:latin typeface="Monaco"/>
+              <a:cs typeface="Monaco"/>
+            </a:endParaRPr>
+          </a:p>
+          <a:p>
+            <a:endParaRPr lang="en-US" dirty="0" smtClean="0">
+              <a:latin typeface="Monaco"/>
+              <a:cs typeface="Monaco"/>
+            </a:endParaRPr>
           </a:p>
         </p:txBody>
       </p:sp>
     </p:spTree>
     <p:extLst>
       <p:ext uri="{BB962C8B-B14F-4D97-AF65-F5344CB8AC3E}">
-        <p14:creationId xmlns:p14="http://schemas.microsoft.com/office/powerpoint/2010/main" val="1447506816"/>
+        <p14:creationId xmlns:p14="http://schemas.microsoft.com/office/powerpoint/2010/main" val="315741488"/>
       </p:ext>
     </p:extLst>
   </p:cSld>
@@ -13116,9 +13839,346 @@
   <p:timing>
     <p:tnLst>
       <p:par>
-        <p:cTn id="1" dur="indefinite" restart="never" nodeType="tmRoot"/>
+        <p:cTn id="1" dur="indefinite" restart="never" nodeType="tmRoot">
+          <p:childTnLst>
+            <p:seq concurrent="1" nextAc="seek">
+              <p:cTn id="2" dur="indefinite" nodeType="mainSeq">
+                <p:childTnLst>
+                  <p:par>
+                    <p:cTn id="3" fill="hold">
+                      <p:stCondLst>
+                        <p:cond delay="indefinite"/>
+                      </p:stCondLst>
+                      <p:childTnLst>
+                        <p:par>
+                          <p:cTn id="4" fill="hold">
+                            <p:stCondLst>
+                              <p:cond delay="0"/>
+                            </p:stCondLst>
+                            <p:childTnLst>
+                              <p:par>
+                                <p:cTn id="5" presetID="1" presetClass="entr" presetSubtype="0" fill="hold" grpId="0" nodeType="clickEffect">
+                                  <p:stCondLst>
+                                    <p:cond delay="0"/>
+                                  </p:stCondLst>
+                                  <p:childTnLst>
+                                    <p:set>
+                                      <p:cBhvr>
+                                        <p:cTn id="6" dur="1" fill="hold">
+                                          <p:stCondLst>
+                                            <p:cond delay="0"/>
+                                          </p:stCondLst>
+                                        </p:cTn>
+                                        <p:tgtEl>
+                                          <p:spTgt spid="4"/>
+                                        </p:tgtEl>
+                                        <p:attrNameLst>
+                                          <p:attrName>style.visibility</p:attrName>
+                                        </p:attrNameLst>
+                                      </p:cBhvr>
+                                      <p:to>
+                                        <p:strVal val="visible"/>
+                                      </p:to>
+                                    </p:set>
+                                  </p:childTnLst>
+                                </p:cTn>
+                              </p:par>
+                            </p:childTnLst>
+                          </p:cTn>
+                        </p:par>
+                      </p:childTnLst>
+                    </p:cTn>
+                  </p:par>
+                  <p:par>
+                    <p:cTn id="7" fill="hold">
+                      <p:stCondLst>
+                        <p:cond delay="indefinite"/>
+                      </p:stCondLst>
+                      <p:childTnLst>
+                        <p:par>
+                          <p:cTn id="8" fill="hold">
+                            <p:stCondLst>
+                              <p:cond delay="0"/>
+                            </p:stCondLst>
+                            <p:childTnLst>
+                              <p:par>
+                                <p:cTn id="9" presetID="1" presetClass="entr" presetSubtype="0" fill="hold" nodeType="clickEffect">
+                                  <p:stCondLst>
+                                    <p:cond delay="0"/>
+                                  </p:stCondLst>
+                                  <p:childTnLst>
+                                    <p:set>
+                                      <p:cBhvr>
+                                        <p:cTn id="10" dur="1" fill="hold">
+                                          <p:stCondLst>
+                                            <p:cond delay="0"/>
+                                          </p:stCondLst>
+                                        </p:cTn>
+                                        <p:tgtEl>
+                                          <p:spTgt spid="4">
+                                            <p:txEl>
+                                              <p:pRg st="2" end="2"/>
+                                            </p:txEl>
+                                          </p:spTgt>
+                                        </p:tgtEl>
+                                        <p:attrNameLst>
+                                          <p:attrName>style.visibility</p:attrName>
+                                        </p:attrNameLst>
+                                      </p:cBhvr>
+                                      <p:to>
+                                        <p:strVal val="visible"/>
+                                      </p:to>
+                                    </p:set>
+                                  </p:childTnLst>
+                                </p:cTn>
+                              </p:par>
+                              <p:par>
+                                <p:cTn id="11" presetID="1" presetClass="entr" presetSubtype="0" fill="hold" nodeType="withEffect">
+                                  <p:stCondLst>
+                                    <p:cond delay="0"/>
+                                  </p:stCondLst>
+                                  <p:childTnLst>
+                                    <p:set>
+                                      <p:cBhvr>
+                                        <p:cTn id="12" dur="1" fill="hold">
+                                          <p:stCondLst>
+                                            <p:cond delay="0"/>
+                                          </p:stCondLst>
+                                        </p:cTn>
+                                        <p:tgtEl>
+                                          <p:spTgt spid="4">
+                                            <p:txEl>
+                                              <p:pRg st="3" end="3"/>
+                                            </p:txEl>
+                                          </p:spTgt>
+                                        </p:tgtEl>
+                                        <p:attrNameLst>
+                                          <p:attrName>style.visibility</p:attrName>
+                                        </p:attrNameLst>
+                                      </p:cBhvr>
+                                      <p:to>
+                                        <p:strVal val="visible"/>
+                                      </p:to>
+                                    </p:set>
+                                  </p:childTnLst>
+                                </p:cTn>
+                              </p:par>
+                              <p:par>
+                                <p:cTn id="13" presetID="1" presetClass="entr" presetSubtype="0" fill="hold" nodeType="withEffect">
+                                  <p:stCondLst>
+                                    <p:cond delay="0"/>
+                                  </p:stCondLst>
+                                  <p:childTnLst>
+                                    <p:set>
+                                      <p:cBhvr>
+                                        <p:cTn id="14" dur="1" fill="hold">
+                                          <p:stCondLst>
+                                            <p:cond delay="0"/>
+                                          </p:stCondLst>
+                                        </p:cTn>
+                                        <p:tgtEl>
+                                          <p:spTgt spid="4">
+                                            <p:txEl>
+                                              <p:pRg st="4" end="4"/>
+                                            </p:txEl>
+                                          </p:spTgt>
+                                        </p:tgtEl>
+                                        <p:attrNameLst>
+                                          <p:attrName>style.visibility</p:attrName>
+                                        </p:attrNameLst>
+                                      </p:cBhvr>
+                                      <p:to>
+                                        <p:strVal val="visible"/>
+                                      </p:to>
+                                    </p:set>
+                                  </p:childTnLst>
+                                </p:cTn>
+                              </p:par>
+                              <p:par>
+                                <p:cTn id="15" presetID="1" presetClass="entr" presetSubtype="0" fill="hold" nodeType="withEffect">
+                                  <p:stCondLst>
+                                    <p:cond delay="0"/>
+                                  </p:stCondLst>
+                                  <p:childTnLst>
+                                    <p:set>
+                                      <p:cBhvr>
+                                        <p:cTn id="16" dur="1" fill="hold">
+                                          <p:stCondLst>
+                                            <p:cond delay="0"/>
+                                          </p:stCondLst>
+                                        </p:cTn>
+                                        <p:tgtEl>
+                                          <p:spTgt spid="4">
+                                            <p:txEl>
+                                              <p:pRg st="5" end="5"/>
+                                            </p:txEl>
+                                          </p:spTgt>
+                                        </p:tgtEl>
+                                        <p:attrNameLst>
+                                          <p:attrName>style.visibility</p:attrName>
+                                        </p:attrNameLst>
+                                      </p:cBhvr>
+                                      <p:to>
+                                        <p:strVal val="visible"/>
+                                      </p:to>
+                                    </p:set>
+                                  </p:childTnLst>
+                                </p:cTn>
+                              </p:par>
+                              <p:par>
+                                <p:cTn id="17" presetID="1" presetClass="entr" presetSubtype="0" fill="hold" nodeType="withEffect">
+                                  <p:stCondLst>
+                                    <p:cond delay="0"/>
+                                  </p:stCondLst>
+                                  <p:childTnLst>
+                                    <p:set>
+                                      <p:cBhvr>
+                                        <p:cTn id="18" dur="1" fill="hold">
+                                          <p:stCondLst>
+                                            <p:cond delay="0"/>
+                                          </p:stCondLst>
+                                        </p:cTn>
+                                        <p:tgtEl>
+                                          <p:spTgt spid="4">
+                                            <p:txEl>
+                                              <p:pRg st="6" end="6"/>
+                                            </p:txEl>
+                                          </p:spTgt>
+                                        </p:tgtEl>
+                                        <p:attrNameLst>
+                                          <p:attrName>style.visibility</p:attrName>
+                                        </p:attrNameLst>
+                                      </p:cBhvr>
+                                      <p:to>
+                                        <p:strVal val="visible"/>
+                                      </p:to>
+                                    </p:set>
+                                  </p:childTnLst>
+                                </p:cTn>
+                              </p:par>
+                              <p:par>
+                                <p:cTn id="19" presetID="1" presetClass="entr" presetSubtype="0" fill="hold" nodeType="withEffect">
+                                  <p:stCondLst>
+                                    <p:cond delay="0"/>
+                                  </p:stCondLst>
+                                  <p:childTnLst>
+                                    <p:set>
+                                      <p:cBhvr>
+                                        <p:cTn id="20" dur="1" fill="hold">
+                                          <p:stCondLst>
+                                            <p:cond delay="0"/>
+                                          </p:stCondLst>
+                                        </p:cTn>
+                                        <p:tgtEl>
+                                          <p:spTgt spid="4">
+                                            <p:txEl>
+                                              <p:pRg st="7" end="7"/>
+                                            </p:txEl>
+                                          </p:spTgt>
+                                        </p:tgtEl>
+                                        <p:attrNameLst>
+                                          <p:attrName>style.visibility</p:attrName>
+                                        </p:attrNameLst>
+                                      </p:cBhvr>
+                                      <p:to>
+                                        <p:strVal val="visible"/>
+                                      </p:to>
+                                    </p:set>
+                                  </p:childTnLst>
+                                </p:cTn>
+                              </p:par>
+                              <p:par>
+                                <p:cTn id="21" presetID="1" presetClass="entr" presetSubtype="0" fill="hold" nodeType="withEffect">
+                                  <p:stCondLst>
+                                    <p:cond delay="0"/>
+                                  </p:stCondLst>
+                                  <p:childTnLst>
+                                    <p:set>
+                                      <p:cBhvr>
+                                        <p:cTn id="22" dur="1" fill="hold">
+                                          <p:stCondLst>
+                                            <p:cond delay="0"/>
+                                          </p:stCondLst>
+                                        </p:cTn>
+                                        <p:tgtEl>
+                                          <p:spTgt spid="4">
+                                            <p:txEl>
+                                              <p:pRg st="9" end="9"/>
+                                            </p:txEl>
+                                          </p:spTgt>
+                                        </p:tgtEl>
+                                        <p:attrNameLst>
+                                          <p:attrName>style.visibility</p:attrName>
+                                        </p:attrNameLst>
+                                      </p:cBhvr>
+                                      <p:to>
+                                        <p:strVal val="visible"/>
+                                      </p:to>
+                                    </p:set>
+                                  </p:childTnLst>
+                                </p:cTn>
+                              </p:par>
+                              <p:par>
+                                <p:cTn id="23" presetID="1" presetClass="entr" presetSubtype="0" fill="hold" nodeType="withEffect">
+                                  <p:stCondLst>
+                                    <p:cond delay="0"/>
+                                  </p:stCondLst>
+                                  <p:childTnLst>
+                                    <p:set>
+                                      <p:cBhvr>
+                                        <p:cTn id="24" dur="1" fill="hold">
+                                          <p:stCondLst>
+                                            <p:cond delay="0"/>
+                                          </p:stCondLst>
+                                        </p:cTn>
+                                        <p:tgtEl>
+                                          <p:spTgt spid="4">
+                                            <p:txEl>
+                                              <p:pRg st="10" end="10"/>
+                                            </p:txEl>
+                                          </p:spTgt>
+                                        </p:tgtEl>
+                                        <p:attrNameLst>
+                                          <p:attrName>style.visibility</p:attrName>
+                                        </p:attrNameLst>
+                                      </p:cBhvr>
+                                      <p:to>
+                                        <p:strVal val="visible"/>
+                                      </p:to>
+                                    </p:set>
+                                  </p:childTnLst>
+                                </p:cTn>
+                              </p:par>
+                            </p:childTnLst>
+                          </p:cTn>
+                        </p:par>
+                      </p:childTnLst>
+                    </p:cTn>
+                  </p:par>
+                </p:childTnLst>
+              </p:cTn>
+              <p:prevCondLst>
+                <p:cond evt="onPrev" delay="0">
+                  <p:tgtEl>
+                    <p:sldTgt/>
+                  </p:tgtEl>
+                </p:cond>
+              </p:prevCondLst>
+              <p:nextCondLst>
+                <p:cond evt="onNext" delay="0">
+                  <p:tgtEl>
+                    <p:sldTgt/>
+                  </p:tgtEl>
+                </p:cond>
+              </p:nextCondLst>
+            </p:seq>
+          </p:childTnLst>
+        </p:cTn>
       </p:par>
     </p:tnLst>
+    <p:bldLst>
+      <p:bldP spid="4" grpId="0"/>
+    </p:bldLst>
   </p:timing>
 </p:sld>
 </file>
@@ -13479,6 +14539,71 @@
     <p:bldLst>
       <p:bldP spid="4" grpId="0" animBg="1"/>
     </p:bldLst>
+  </p:timing>
+</p:sld>
+</file>
+
+<file path=ppt/slides/slide30.xml><?xml version="1.0" encoding="utf-8"?>
+<p:sld xmlns:a="http://schemas.openxmlformats.org/drawingml/2006/main" xmlns:r="http://schemas.openxmlformats.org/officeDocument/2006/relationships" xmlns:p="http://schemas.openxmlformats.org/presentationml/2006/main">
+  <p:cSld>
+    <p:spTree>
+      <p:nvGrpSpPr>
+        <p:cNvPr id="1" name=""/>
+        <p:cNvGrpSpPr/>
+        <p:nvPr/>
+      </p:nvGrpSpPr>
+      <p:grpSpPr>
+        <a:xfrm>
+          <a:off x="0" y="0"/>
+          <a:ext cx="0" cy="0"/>
+          <a:chOff x="0" y="0"/>
+          <a:chExt cx="0" cy="0"/>
+        </a:xfrm>
+      </p:grpSpPr>
+      <p:sp>
+        <p:nvSpPr>
+          <p:cNvPr id="2" name="Title 1"/>
+          <p:cNvSpPr>
+            <a:spLocks noGrp="1"/>
+          </p:cNvSpPr>
+          <p:nvPr>
+            <p:ph type="title"/>
+          </p:nvPr>
+        </p:nvSpPr>
+        <p:spPr>
+          <a:xfrm>
+            <a:off x="2230714" y="3087537"/>
+            <a:ext cx="4688183" cy="692215"/>
+          </a:xfrm>
+        </p:spPr>
+        <p:txBody>
+          <a:bodyPr/>
+          <a:lstStyle/>
+          <a:p>
+            <a:r>
+              <a:rPr lang="en-US" dirty="0" smtClean="0"/>
+              <a:t>exercise break</a:t>
+            </a:r>
+            <a:endParaRPr lang="en-US" dirty="0"/>
+          </a:p>
+        </p:txBody>
+      </p:sp>
+    </p:spTree>
+    <p:extLst>
+      <p:ext uri="{BB962C8B-B14F-4D97-AF65-F5344CB8AC3E}">
+        <p14:creationId xmlns:p14="http://schemas.microsoft.com/office/powerpoint/2010/main" val="1447506816"/>
+      </p:ext>
+    </p:extLst>
+  </p:cSld>
+  <p:clrMapOvr>
+    <a:masterClrMapping/>
+  </p:clrMapOvr>
+  <p:timing>
+    <p:tnLst>
+      <p:par>
+        <p:cTn id="1" dur="indefinite" restart="never" nodeType="tmRoot"/>
+      </p:par>
+    </p:tnLst>
   </p:timing>
 </p:sld>
 </file>

</xml_diff>